<commit_message>
Class Diagram and UX Diagram Changes
</commit_message>
<xml_diff>
--- a/SnakeGame/Documents/Class_Diagram.pptx
+++ b/SnakeGame/Documents/Class_Diagram.pptx
@@ -259,7 +259,7 @@
           <a:p>
             <a:fld id="{98ED1625-9CE3-421F-AAFC-FE64A64B26A2}" type="datetimeFigureOut">
               <a:rPr lang="en-US" smtClean="0"/>
-              <a:t>10/13/2019</a:t>
+              <a:t>12/2/2019</a:t>
             </a:fld>
             <a:endParaRPr lang="en-US"/>
           </a:p>
@@ -457,7 +457,7 @@
           <a:p>
             <a:fld id="{98ED1625-9CE3-421F-AAFC-FE64A64B26A2}" type="datetimeFigureOut">
               <a:rPr lang="en-US" smtClean="0"/>
-              <a:t>10/13/2019</a:t>
+              <a:t>12/2/2019</a:t>
             </a:fld>
             <a:endParaRPr lang="en-US"/>
           </a:p>
@@ -665,7 +665,7 @@
           <a:p>
             <a:fld id="{98ED1625-9CE3-421F-AAFC-FE64A64B26A2}" type="datetimeFigureOut">
               <a:rPr lang="en-US" smtClean="0"/>
-              <a:t>10/13/2019</a:t>
+              <a:t>12/2/2019</a:t>
             </a:fld>
             <a:endParaRPr lang="en-US"/>
           </a:p>
@@ -863,7 +863,7 @@
           <a:p>
             <a:fld id="{98ED1625-9CE3-421F-AAFC-FE64A64B26A2}" type="datetimeFigureOut">
               <a:rPr lang="en-US" smtClean="0"/>
-              <a:t>10/13/2019</a:t>
+              <a:t>12/2/2019</a:t>
             </a:fld>
             <a:endParaRPr lang="en-US"/>
           </a:p>
@@ -1138,7 +1138,7 @@
           <a:p>
             <a:fld id="{98ED1625-9CE3-421F-AAFC-FE64A64B26A2}" type="datetimeFigureOut">
               <a:rPr lang="en-US" smtClean="0"/>
-              <a:t>10/13/2019</a:t>
+              <a:t>12/2/2019</a:t>
             </a:fld>
             <a:endParaRPr lang="en-US"/>
           </a:p>
@@ -1403,7 +1403,7 @@
           <a:p>
             <a:fld id="{98ED1625-9CE3-421F-AAFC-FE64A64B26A2}" type="datetimeFigureOut">
               <a:rPr lang="en-US" smtClean="0"/>
-              <a:t>10/13/2019</a:t>
+              <a:t>12/2/2019</a:t>
             </a:fld>
             <a:endParaRPr lang="en-US"/>
           </a:p>
@@ -1815,7 +1815,7 @@
           <a:p>
             <a:fld id="{98ED1625-9CE3-421F-AAFC-FE64A64B26A2}" type="datetimeFigureOut">
               <a:rPr lang="en-US" smtClean="0"/>
-              <a:t>10/13/2019</a:t>
+              <a:t>12/2/2019</a:t>
             </a:fld>
             <a:endParaRPr lang="en-US"/>
           </a:p>
@@ -1956,7 +1956,7 @@
           <a:p>
             <a:fld id="{98ED1625-9CE3-421F-AAFC-FE64A64B26A2}" type="datetimeFigureOut">
               <a:rPr lang="en-US" smtClean="0"/>
-              <a:t>10/13/2019</a:t>
+              <a:t>12/2/2019</a:t>
             </a:fld>
             <a:endParaRPr lang="en-US"/>
           </a:p>
@@ -2069,7 +2069,7 @@
           <a:p>
             <a:fld id="{98ED1625-9CE3-421F-AAFC-FE64A64B26A2}" type="datetimeFigureOut">
               <a:rPr lang="en-US" smtClean="0"/>
-              <a:t>10/13/2019</a:t>
+              <a:t>12/2/2019</a:t>
             </a:fld>
             <a:endParaRPr lang="en-US"/>
           </a:p>
@@ -2380,7 +2380,7 @@
           <a:p>
             <a:fld id="{98ED1625-9CE3-421F-AAFC-FE64A64B26A2}" type="datetimeFigureOut">
               <a:rPr lang="en-US" smtClean="0"/>
-              <a:t>10/13/2019</a:t>
+              <a:t>12/2/2019</a:t>
             </a:fld>
             <a:endParaRPr lang="en-US"/>
           </a:p>
@@ -2668,7 +2668,7 @@
           <a:p>
             <a:fld id="{98ED1625-9CE3-421F-AAFC-FE64A64B26A2}" type="datetimeFigureOut">
               <a:rPr lang="en-US" smtClean="0"/>
-              <a:t>10/13/2019</a:t>
+              <a:t>12/2/2019</a:t>
             </a:fld>
             <a:endParaRPr lang="en-US"/>
           </a:p>
@@ -2909,7 +2909,7 @@
           <a:p>
             <a:fld id="{98ED1625-9CE3-421F-AAFC-FE64A64B26A2}" type="datetimeFigureOut">
               <a:rPr lang="en-US" smtClean="0"/>
-              <a:t>10/13/2019</a:t>
+              <a:t>12/2/2019</a:t>
             </a:fld>
             <a:endParaRPr lang="en-US"/>
           </a:p>
@@ -3328,10 +3328,10 @@
       </p:grpSpPr>
       <p:sp>
         <p:nvSpPr>
-          <p:cNvPr id="4" name="Rectangle 3">
-            <a:extLst>
-              <a:ext uri="{FF2B5EF4-FFF2-40B4-BE49-F238E27FC236}">
-                <a16:creationId xmlns:a16="http://schemas.microsoft.com/office/drawing/2014/main" id="{9CB2F7CB-28DB-427C-BE4E-14C5E1FA1D54}"/>
+          <p:cNvPr id="7" name="Rectangle 6">
+            <a:extLst>
+              <a:ext uri="{FF2B5EF4-FFF2-40B4-BE49-F238E27FC236}">
+                <a16:creationId xmlns:a16="http://schemas.microsoft.com/office/drawing/2014/main" id="{96E80C7D-A615-41F1-89FD-8BEF34F08ADE}"/>
               </a:ext>
             </a:extLst>
           </p:cNvPr>
@@ -3340,118 +3340,7 @@
         </p:nvSpPr>
         <p:spPr>
           <a:xfrm>
-            <a:off x="962527" y="832513"/>
-            <a:ext cx="1030046" cy="450855"/>
-          </a:xfrm>
-          <a:prstGeom prst="rect">
-            <a:avLst/>
-          </a:prstGeom>
-          <a:noFill/>
-          <a:ln w="19050" cap="flat" cmpd="sng" algn="ctr">
-            <a:solidFill>
-              <a:schemeClr val="dk1"/>
-            </a:solidFill>
-            <a:prstDash val="solid"/>
-            <a:round/>
-            <a:headEnd type="none" w="med" len="med"/>
-            <a:tailEnd type="none" w="med" len="med"/>
-          </a:ln>
-        </p:spPr>
-        <p:style>
-          <a:lnRef idx="0">
-            <a:scrgbClr r="0" g="0" b="0"/>
-          </a:lnRef>
-          <a:fillRef idx="0">
-            <a:scrgbClr r="0" g="0" b="0"/>
-          </a:fillRef>
-          <a:effectRef idx="0">
-            <a:scrgbClr r="0" g="0" b="0"/>
-          </a:effectRef>
-          <a:fontRef idx="minor">
-            <a:schemeClr val="dk1"/>
-          </a:fontRef>
-        </p:style>
-        <p:txBody>
-          <a:bodyPr rtlCol="0" anchor="ctr"/>
-          <a:lstStyle/>
-          <a:p>
-            <a:pPr algn="ctr"/>
-            <a:r>
-              <a:rPr lang="en-US" sz="1200" b="1" dirty="0">
-                <a:solidFill>
-                  <a:schemeClr val="tx1"/>
-                </a:solidFill>
-                <a:latin typeface="Times New Roman" panose="02020603050405020304" pitchFamily="18" charset="0"/>
-                <a:cs typeface="Times New Roman" panose="02020603050405020304" pitchFamily="18" charset="0"/>
-              </a:rPr>
-              <a:t>Client</a:t>
-            </a:r>
-          </a:p>
-        </p:txBody>
-      </p:sp>
-      <p:cxnSp>
-        <p:nvCxnSpPr>
-          <p:cNvPr id="6" name="Straight Arrow Connector 5">
-            <a:extLst>
-              <a:ext uri="{FF2B5EF4-FFF2-40B4-BE49-F238E27FC236}">
-                <a16:creationId xmlns:a16="http://schemas.microsoft.com/office/drawing/2014/main" id="{6FA0DD19-6FD4-4A57-8CA7-CD0B3EB7FD91}"/>
-              </a:ext>
-            </a:extLst>
-          </p:cNvPr>
-          <p:cNvCxnSpPr>
-            <a:cxnSpLocks/>
-            <a:stCxn id="4" idx="3"/>
-          </p:cNvCxnSpPr>
-          <p:nvPr/>
-        </p:nvCxnSpPr>
-        <p:spPr>
-          <a:xfrm>
-            <a:off x="1992573" y="1057941"/>
-            <a:ext cx="1245577" cy="0"/>
-          </a:xfrm>
-          <a:prstGeom prst="straightConnector1">
-            <a:avLst/>
-          </a:prstGeom>
-          <a:ln w="9525" cap="flat" cmpd="sng" algn="ctr">
-            <a:solidFill>
-              <a:schemeClr val="dk1"/>
-            </a:solidFill>
-            <a:prstDash val="solid"/>
-            <a:round/>
-            <a:headEnd type="none" w="med" len="med"/>
-            <a:tailEnd type="arrow" w="med" len="med"/>
-          </a:ln>
-        </p:spPr>
-        <p:style>
-          <a:lnRef idx="0">
-            <a:scrgbClr r="0" g="0" b="0"/>
-          </a:lnRef>
-          <a:fillRef idx="0">
-            <a:scrgbClr r="0" g="0" b="0"/>
-          </a:fillRef>
-          <a:effectRef idx="0">
-            <a:scrgbClr r="0" g="0" b="0"/>
-          </a:effectRef>
-          <a:fontRef idx="minor">
-            <a:schemeClr val="tx1"/>
-          </a:fontRef>
-        </p:style>
-      </p:cxnSp>
-      <p:sp>
-        <p:nvSpPr>
-          <p:cNvPr id="7" name="Rectangle 6">
-            <a:extLst>
-              <a:ext uri="{FF2B5EF4-FFF2-40B4-BE49-F238E27FC236}">
-                <a16:creationId xmlns:a16="http://schemas.microsoft.com/office/drawing/2014/main" id="{96E80C7D-A615-41F1-89FD-8BEF34F08ADE}"/>
-              </a:ext>
-            </a:extLst>
-          </p:cNvPr>
-          <p:cNvSpPr/>
-          <p:nvPr/>
-        </p:nvSpPr>
-        <p:spPr>
-          <a:xfrm>
-            <a:off x="3316406" y="832513"/>
+            <a:off x="4076131" y="901023"/>
             <a:ext cx="2019869" cy="450855"/>
           </a:xfrm>
           <a:prstGeom prst="rect">
@@ -3485,20 +3374,7 @@
                 <a:latin typeface="Times New Roman" panose="02020603050405020304" pitchFamily="18" charset="0"/>
                 <a:cs typeface="Times New Roman" panose="02020603050405020304" pitchFamily="18" charset="0"/>
               </a:rPr>
-              <a:t>&lt;&lt;Interface&gt;&gt;</a:t>
-            </a:r>
-          </a:p>
-          <a:p>
-            <a:pPr algn="ctr"/>
-            <a:r>
-              <a:rPr lang="en-US" sz="1200" b="1" dirty="0">
-                <a:solidFill>
-                  <a:schemeClr val="tx1"/>
-                </a:solidFill>
-                <a:latin typeface="Times New Roman" panose="02020603050405020304" pitchFamily="18" charset="0"/>
-                <a:cs typeface="Times New Roman" panose="02020603050405020304" pitchFamily="18" charset="0"/>
-              </a:rPr>
-              <a:t>Snake</a:t>
+              <a:t>Menu</a:t>
             </a:r>
           </a:p>
         </p:txBody>
@@ -3517,8 +3393,8 @@
         </p:nvSpPr>
         <p:spPr>
           <a:xfrm>
-            <a:off x="3316406" y="1283368"/>
-            <a:ext cx="2019869" cy="613671"/>
+            <a:off x="4076131" y="1351878"/>
+            <a:ext cx="2019869" cy="235039"/>
           </a:xfrm>
           <a:prstGeom prst="rect">
             <a:avLst/>
@@ -3557,30 +3433,7 @@
                 <a:latin typeface="Times New Roman" panose="02020603050405020304" pitchFamily="18" charset="0"/>
                 <a:cs typeface="Times New Roman" panose="02020603050405020304" pitchFamily="18" charset="0"/>
               </a:rPr>
-              <a:t>+string direction;</a:t>
-            </a:r>
-          </a:p>
-          <a:p>
-            <a:r>
-              <a:rPr lang="en-US" sz="1200" dirty="0">
-                <a:latin typeface="Times New Roman" panose="02020603050405020304" pitchFamily="18" charset="0"/>
-                <a:cs typeface="Times New Roman" panose="02020603050405020304" pitchFamily="18" charset="0"/>
-              </a:rPr>
-              <a:t>Boolean </a:t>
-            </a:r>
-            <a:r>
-              <a:rPr lang="en-US" sz="1200" dirty="0" err="1">
-                <a:latin typeface="Times New Roman" panose="02020603050405020304" pitchFamily="18" charset="0"/>
-                <a:cs typeface="Times New Roman" panose="02020603050405020304" pitchFamily="18" charset="0"/>
-              </a:rPr>
-              <a:t>gameOver</a:t>
-            </a:r>
-            <a:r>
-              <a:rPr lang="en-US" sz="1200" dirty="0">
-                <a:latin typeface="Times New Roman" panose="02020603050405020304" pitchFamily="18" charset="0"/>
-                <a:cs typeface="Times New Roman" panose="02020603050405020304" pitchFamily="18" charset="0"/>
-              </a:rPr>
-              <a:t>;</a:t>
+              <a:t>-int choice = 0;</a:t>
             </a:r>
           </a:p>
         </p:txBody>
@@ -3599,8 +3452,8 @@
         </p:nvSpPr>
         <p:spPr>
           <a:xfrm>
-            <a:off x="3316406" y="1897039"/>
-            <a:ext cx="2019869" cy="968991"/>
+            <a:off x="4076131" y="1576350"/>
+            <a:ext cx="2019869" cy="778159"/>
           </a:xfrm>
           <a:prstGeom prst="rect">
             <a:avLst/>
@@ -3629,7 +3482,7 @@
                 <a:latin typeface="Times New Roman" panose="02020603050405020304" pitchFamily="18" charset="0"/>
                 <a:cs typeface="Times New Roman" panose="02020603050405020304" pitchFamily="18" charset="0"/>
               </a:rPr>
-              <a:t>+public void direction()</a:t>
+              <a:t>+Menu();</a:t>
             </a:r>
           </a:p>
           <a:p>
@@ -3638,39 +3491,16 @@
                 <a:latin typeface="Times New Roman" panose="02020603050405020304" pitchFamily="18" charset="0"/>
                 <a:cs typeface="Times New Roman" panose="02020603050405020304" pitchFamily="18" charset="0"/>
               </a:rPr>
-              <a:t>-public void </a:t>
-            </a:r>
-            <a:r>
-              <a:rPr lang="en-US" sz="1200" dirty="0" err="1">
-                <a:latin typeface="Times New Roman" panose="02020603050405020304" pitchFamily="18" charset="0"/>
-                <a:cs typeface="Times New Roman" panose="02020603050405020304" pitchFamily="18" charset="0"/>
-              </a:rPr>
-              <a:t>playsnake</a:t>
-            </a:r>
+              <a:t>+string DisplayChoices(int _index);</a:t>
+            </a:r>
+          </a:p>
+          <a:p>
             <a:r>
               <a:rPr lang="en-US" sz="1200" dirty="0">
                 <a:latin typeface="Times New Roman" panose="02020603050405020304" pitchFamily="18" charset="0"/>
                 <a:cs typeface="Times New Roman" panose="02020603050405020304" pitchFamily="18" charset="0"/>
               </a:rPr>
-              <a:t>()</a:t>
-            </a:r>
-          </a:p>
-          <a:p>
-            <a:r>
-              <a:rPr lang="en-US" sz="1200" dirty="0">
-                <a:latin typeface="Times New Roman" panose="02020603050405020304" pitchFamily="18" charset="0"/>
-                <a:cs typeface="Times New Roman" panose="02020603050405020304" pitchFamily="18" charset="0"/>
-              </a:rPr>
-              <a:t>-public void exit()</a:t>
-            </a:r>
-          </a:p>
-          <a:p>
-            <a:r>
-              <a:rPr lang="en-US" sz="1200" dirty="0">
-                <a:latin typeface="Times New Roman" panose="02020603050405020304" pitchFamily="18" charset="0"/>
-                <a:cs typeface="Times New Roman" panose="02020603050405020304" pitchFamily="18" charset="0"/>
-              </a:rPr>
-              <a:t>+public void display()</a:t>
+              <a:t>+~Menu();</a:t>
             </a:r>
           </a:p>
         </p:txBody>
@@ -3689,7 +3519,7 @@
         </p:nvSpPr>
         <p:spPr>
           <a:xfrm>
-            <a:off x="6855727" y="832513"/>
+            <a:off x="7552013" y="1468862"/>
             <a:ext cx="2019869" cy="450855"/>
           </a:xfrm>
           <a:prstGeom prst="rect">
@@ -3716,22 +3546,15 @@
           <a:p>
             <a:pPr algn="ctr"/>
             <a:r>
-              <a:rPr lang="en-US" sz="1200" b="1" dirty="0" err="1">
+              <a:rPr lang="en-US" sz="1200" b="1" dirty="0">
                 <a:solidFill>
                   <a:schemeClr val="tx1"/>
                 </a:solidFill>
                 <a:latin typeface="Times New Roman" panose="02020603050405020304" pitchFamily="18" charset="0"/>
                 <a:cs typeface="Times New Roman" panose="02020603050405020304" pitchFamily="18" charset="0"/>
               </a:rPr>
-              <a:t>MoveMechanics</a:t>
-            </a:r>
-            <a:endParaRPr lang="en-US" sz="1200" b="1" dirty="0">
-              <a:solidFill>
-                <a:schemeClr val="tx1"/>
-              </a:solidFill>
-              <a:latin typeface="Times New Roman" panose="02020603050405020304" pitchFamily="18" charset="0"/>
-              <a:cs typeface="Times New Roman" panose="02020603050405020304" pitchFamily="18" charset="0"/>
-            </a:endParaRPr>
+              <a:t>Snake</a:t>
+            </a:r>
           </a:p>
         </p:txBody>
       </p:sp>
@@ -3749,8 +3572,8 @@
         </p:nvSpPr>
         <p:spPr>
           <a:xfrm>
-            <a:off x="6855727" y="1283369"/>
-            <a:ext cx="2019869" cy="934870"/>
+            <a:off x="7552013" y="1919718"/>
+            <a:ext cx="2019869" cy="450854"/>
           </a:xfrm>
           <a:prstGeom prst="rect">
             <a:avLst/>
@@ -3789,7 +3612,7 @@
                 <a:latin typeface="Times New Roman" panose="02020603050405020304" pitchFamily="18" charset="0"/>
                 <a:cs typeface="Times New Roman" panose="02020603050405020304" pitchFamily="18" charset="0"/>
               </a:rPr>
-              <a:t>+string direction;</a:t>
+              <a:t>+int x, y;</a:t>
             </a:r>
           </a:p>
           <a:p>
@@ -3798,21 +3621,7 @@
                 <a:latin typeface="Times New Roman" panose="02020603050405020304" pitchFamily="18" charset="0"/>
                 <a:cs typeface="Times New Roman" panose="02020603050405020304" pitchFamily="18" charset="0"/>
               </a:rPr>
-              <a:t>-long double </a:t>
-            </a:r>
-            <a:r>
-              <a:rPr lang="en-US" sz="1200" dirty="0" err="1">
-                <a:latin typeface="Times New Roman" panose="02020603050405020304" pitchFamily="18" charset="0"/>
-                <a:cs typeface="Times New Roman" panose="02020603050405020304" pitchFamily="18" charset="0"/>
-              </a:rPr>
-              <a:t>delSpeed</a:t>
-            </a:r>
-            <a:r>
-              <a:rPr lang="en-US" sz="1200" dirty="0">
-                <a:latin typeface="Times New Roman" panose="02020603050405020304" pitchFamily="18" charset="0"/>
-                <a:cs typeface="Times New Roman" panose="02020603050405020304" pitchFamily="18" charset="0"/>
-              </a:rPr>
-              <a:t>;</a:t>
+              <a:t>+unsigned int length;</a:t>
             </a:r>
           </a:p>
         </p:txBody>
@@ -3831,94 +3640,7 @@
         </p:nvSpPr>
         <p:spPr>
           <a:xfrm>
-            <a:off x="6855727" y="2218238"/>
-            <a:ext cx="2019869" cy="814975"/>
-          </a:xfrm>
-          <a:prstGeom prst="rect">
-            <a:avLst/>
-          </a:prstGeom>
-        </p:spPr>
-        <p:style>
-          <a:lnRef idx="2">
-            <a:schemeClr val="dk1"/>
-          </a:lnRef>
-          <a:fillRef idx="1">
-            <a:schemeClr val="lt1"/>
-          </a:fillRef>
-          <a:effectRef idx="0">
-            <a:schemeClr val="dk1"/>
-          </a:effectRef>
-          <a:fontRef idx="minor">
-            <a:schemeClr val="dk1"/>
-          </a:fontRef>
-        </p:style>
-        <p:txBody>
-          <a:bodyPr rtlCol="0" anchor="ctr"/>
-          <a:lstStyle/>
-          <a:p>
-            <a:r>
-              <a:rPr lang="en-US" sz="1200" dirty="0">
-                <a:latin typeface="Times New Roman" panose="02020603050405020304" pitchFamily="18" charset="0"/>
-                <a:cs typeface="Times New Roman" panose="02020603050405020304" pitchFamily="18" charset="0"/>
-              </a:rPr>
-              <a:t>-delay()</a:t>
-            </a:r>
-          </a:p>
-          <a:p>
-            <a:r>
-              <a:rPr lang="en-US" sz="1200" dirty="0">
-                <a:latin typeface="Times New Roman" panose="02020603050405020304" pitchFamily="18" charset="0"/>
-                <a:cs typeface="Times New Roman" panose="02020603050405020304" pitchFamily="18" charset="0"/>
-              </a:rPr>
-              <a:t>+</a:t>
-            </a:r>
-            <a:r>
-              <a:rPr lang="en-US" sz="1200" dirty="0" err="1">
-                <a:latin typeface="Times New Roman" panose="02020603050405020304" pitchFamily="18" charset="0"/>
-                <a:cs typeface="Times New Roman" panose="02020603050405020304" pitchFamily="18" charset="0"/>
-              </a:rPr>
-              <a:t>deltaspeed</a:t>
-            </a:r>
-            <a:r>
-              <a:rPr lang="en-US" sz="1200" dirty="0">
-                <a:latin typeface="Times New Roman" panose="02020603050405020304" pitchFamily="18" charset="0"/>
-                <a:cs typeface="Times New Roman" panose="02020603050405020304" pitchFamily="18" charset="0"/>
-              </a:rPr>
-              <a:t>()</a:t>
-            </a:r>
-          </a:p>
-          <a:p>
-            <a:r>
-              <a:rPr lang="en-US" sz="1200" dirty="0">
-                <a:latin typeface="Times New Roman" panose="02020603050405020304" pitchFamily="18" charset="0"/>
-                <a:cs typeface="Times New Roman" panose="02020603050405020304" pitchFamily="18" charset="0"/>
-              </a:rPr>
-              <a:t>#move()</a:t>
-            </a:r>
-          </a:p>
-          <a:p>
-            <a:endParaRPr lang="en-US" sz="1200" dirty="0">
-              <a:latin typeface="Times New Roman" panose="02020603050405020304" pitchFamily="18" charset="0"/>
-              <a:cs typeface="Times New Roman" panose="02020603050405020304" pitchFamily="18" charset="0"/>
-            </a:endParaRPr>
-          </a:p>
-        </p:txBody>
-      </p:sp>
-      <p:sp>
-        <p:nvSpPr>
-          <p:cNvPr id="13" name="Rectangle 12">
-            <a:extLst>
-              <a:ext uri="{FF2B5EF4-FFF2-40B4-BE49-F238E27FC236}">
-                <a16:creationId xmlns:a16="http://schemas.microsoft.com/office/drawing/2014/main" id="{595A237F-27E8-4929-91E6-89DBD43B5279}"/>
-              </a:ext>
-            </a:extLst>
-          </p:cNvPr>
-          <p:cNvSpPr/>
-          <p:nvPr/>
-        </p:nvSpPr>
-        <p:spPr>
-          <a:xfrm>
-            <a:off x="3316406" y="3337591"/>
+            <a:off x="7552013" y="2354509"/>
             <a:ext cx="2019869" cy="450855"/>
           </a:xfrm>
           <a:prstGeom prst="rect">
@@ -3943,6 +3665,61 @@
           <a:bodyPr rtlCol="0" anchor="ctr"/>
           <a:lstStyle/>
           <a:p>
+            <a:r>
+              <a:rPr lang="en-US" sz="1200" dirty="0">
+                <a:latin typeface="Times New Roman" panose="02020603050405020304" pitchFamily="18" charset="0"/>
+                <a:cs typeface="Times New Roman" panose="02020603050405020304" pitchFamily="18" charset="0"/>
+              </a:rPr>
+              <a:t>+void CreateSnake();</a:t>
+            </a:r>
+          </a:p>
+          <a:p>
+            <a:endParaRPr lang="en-US" sz="1200" dirty="0">
+              <a:latin typeface="Times New Roman" panose="02020603050405020304" pitchFamily="18" charset="0"/>
+              <a:cs typeface="Times New Roman" panose="02020603050405020304" pitchFamily="18" charset="0"/>
+            </a:endParaRPr>
+          </a:p>
+        </p:txBody>
+      </p:sp>
+      <p:sp>
+        <p:nvSpPr>
+          <p:cNvPr id="13" name="Rectangle 12">
+            <a:extLst>
+              <a:ext uri="{FF2B5EF4-FFF2-40B4-BE49-F238E27FC236}">
+                <a16:creationId xmlns:a16="http://schemas.microsoft.com/office/drawing/2014/main" id="{595A237F-27E8-4929-91E6-89DBD43B5279}"/>
+              </a:ext>
+            </a:extLst>
+          </p:cNvPr>
+          <p:cNvSpPr/>
+          <p:nvPr/>
+        </p:nvSpPr>
+        <p:spPr>
+          <a:xfrm>
+            <a:off x="4076132" y="3052364"/>
+            <a:ext cx="2019869" cy="450855"/>
+          </a:xfrm>
+          <a:prstGeom prst="rect">
+            <a:avLst/>
+          </a:prstGeom>
+        </p:spPr>
+        <p:style>
+          <a:lnRef idx="2">
+            <a:schemeClr val="dk1"/>
+          </a:lnRef>
+          <a:fillRef idx="1">
+            <a:schemeClr val="lt1"/>
+          </a:fillRef>
+          <a:effectRef idx="0">
+            <a:schemeClr val="dk1"/>
+          </a:effectRef>
+          <a:fontRef idx="minor">
+            <a:schemeClr val="dk1"/>
+          </a:fontRef>
+        </p:style>
+        <p:txBody>
+          <a:bodyPr rtlCol="0" anchor="ctr"/>
+          <a:lstStyle/>
+          <a:p>
             <a:pPr algn="ctr"/>
             <a:r>
               <a:rPr lang="en-US" sz="1200" b="1" dirty="0">
@@ -3952,7 +3729,7 @@
                 <a:latin typeface="Times New Roman" panose="02020603050405020304" pitchFamily="18" charset="0"/>
                 <a:cs typeface="Times New Roman" panose="02020603050405020304" pitchFamily="18" charset="0"/>
               </a:rPr>
-              <a:t>Print</a:t>
+              <a:t>Input</a:t>
             </a:r>
           </a:p>
         </p:txBody>
@@ -3971,8 +3748,8 @@
         </p:nvSpPr>
         <p:spPr>
           <a:xfrm>
-            <a:off x="3316406" y="3788446"/>
-            <a:ext cx="2019869" cy="968991"/>
+            <a:off x="4076132" y="3503219"/>
+            <a:ext cx="2019869" cy="808721"/>
           </a:xfrm>
           <a:prstGeom prst="rect">
             <a:avLst/>
@@ -4011,21 +3788,16 @@
                 <a:latin typeface="Times New Roman" panose="02020603050405020304" pitchFamily="18" charset="0"/>
                 <a:cs typeface="Times New Roman" panose="02020603050405020304" pitchFamily="18" charset="0"/>
               </a:rPr>
-              <a:t>-int </a:t>
-            </a:r>
-            <a:r>
-              <a:rPr lang="en-US" sz="1200" dirty="0" err="1">
-                <a:latin typeface="Times New Roman" panose="02020603050405020304" pitchFamily="18" charset="0"/>
-                <a:cs typeface="Times New Roman" panose="02020603050405020304" pitchFamily="18" charset="0"/>
-              </a:rPr>
-              <a:t>drawP</a:t>
-            </a:r>
+              <a:t>#define KEY_UP 'w'</a:t>
+            </a:r>
+          </a:p>
+          <a:p>
             <a:r>
               <a:rPr lang="en-US" sz="1200" dirty="0">
                 <a:latin typeface="Times New Roman" panose="02020603050405020304" pitchFamily="18" charset="0"/>
                 <a:cs typeface="Times New Roman" panose="02020603050405020304" pitchFamily="18" charset="0"/>
               </a:rPr>
-              <a:t>;</a:t>
+              <a:t>#define KEY_DOWN 's'</a:t>
             </a:r>
           </a:p>
           <a:p>
@@ -4034,7 +3806,7 @@
                 <a:latin typeface="Times New Roman" panose="02020603050405020304" pitchFamily="18" charset="0"/>
                 <a:cs typeface="Times New Roman" panose="02020603050405020304" pitchFamily="18" charset="0"/>
               </a:rPr>
-              <a:t>-int board[][];</a:t>
+              <a:t>#define KEY_LEFT 'a'</a:t>
             </a:r>
           </a:p>
           <a:p>
@@ -4043,44 +3815,7 @@
                 <a:latin typeface="Times New Roman" panose="02020603050405020304" pitchFamily="18" charset="0"/>
                 <a:cs typeface="Times New Roman" panose="02020603050405020304" pitchFamily="18" charset="0"/>
               </a:rPr>
-              <a:t>-int </a:t>
-            </a:r>
-            <a:r>
-              <a:rPr lang="en-US" sz="1200" dirty="0" err="1">
-                <a:latin typeface="Times New Roman" panose="02020603050405020304" pitchFamily="18" charset="0"/>
-                <a:cs typeface="Times New Roman" panose="02020603050405020304" pitchFamily="18" charset="0"/>
-              </a:rPr>
-              <a:t>foodX</a:t>
-            </a:r>
-            <a:r>
-              <a:rPr lang="en-US" sz="1200" dirty="0">
-                <a:latin typeface="Times New Roman" panose="02020603050405020304" pitchFamily="18" charset="0"/>
-                <a:cs typeface="Times New Roman" panose="02020603050405020304" pitchFamily="18" charset="0"/>
-              </a:rPr>
-              <a:t>;</a:t>
-            </a:r>
-          </a:p>
-          <a:p>
-            <a:r>
-              <a:rPr lang="en-US" sz="1200" dirty="0">
-                <a:latin typeface="Times New Roman" panose="02020603050405020304" pitchFamily="18" charset="0"/>
-                <a:cs typeface="Times New Roman" panose="02020603050405020304" pitchFamily="18" charset="0"/>
-              </a:rPr>
-              <a:t>-int </a:t>
-            </a:r>
-            <a:r>
-              <a:rPr lang="en-US" sz="1200" dirty="0" err="1">
-                <a:latin typeface="Times New Roman" panose="02020603050405020304" pitchFamily="18" charset="0"/>
-                <a:cs typeface="Times New Roman" panose="02020603050405020304" pitchFamily="18" charset="0"/>
-              </a:rPr>
-              <a:t>foodY</a:t>
-            </a:r>
-            <a:r>
-              <a:rPr lang="en-US" sz="1200" dirty="0">
-                <a:latin typeface="Times New Roman" panose="02020603050405020304" pitchFamily="18" charset="0"/>
-                <a:cs typeface="Times New Roman" panose="02020603050405020304" pitchFamily="18" charset="0"/>
-              </a:rPr>
-              <a:t>;</a:t>
+              <a:t>#define KEY_RIGHT 'd'</a:t>
             </a:r>
           </a:p>
         </p:txBody>
@@ -4099,8 +3834,8 @@
         </p:nvSpPr>
         <p:spPr>
           <a:xfrm>
-            <a:off x="3316406" y="4757437"/>
-            <a:ext cx="2019869" cy="1176641"/>
+            <a:off x="4076130" y="4311940"/>
+            <a:ext cx="2019869" cy="967795"/>
           </a:xfrm>
           <a:prstGeom prst="rect">
             <a:avLst/>
@@ -4129,21 +3864,16 @@
                 <a:latin typeface="Times New Roman" panose="02020603050405020304" pitchFamily="18" charset="0"/>
                 <a:cs typeface="Times New Roman" panose="02020603050405020304" pitchFamily="18" charset="0"/>
               </a:rPr>
-              <a:t>+void </a:t>
-            </a:r>
-            <a:r>
-              <a:rPr lang="en-US" sz="1200" dirty="0" err="1">
-                <a:latin typeface="Times New Roman" panose="02020603050405020304" pitchFamily="18" charset="0"/>
-                <a:cs typeface="Times New Roman" panose="02020603050405020304" pitchFamily="18" charset="0"/>
-              </a:rPr>
-              <a:t>drawPlayer</a:t>
-            </a:r>
+              <a:t>+Input();</a:t>
+            </a:r>
+          </a:p>
+          <a:p>
             <a:r>
               <a:rPr lang="en-US" sz="1200" dirty="0">
                 <a:latin typeface="Times New Roman" panose="02020603050405020304" pitchFamily="18" charset="0"/>
                 <a:cs typeface="Times New Roman" panose="02020603050405020304" pitchFamily="18" charset="0"/>
               </a:rPr>
-              <a:t>()</a:t>
+              <a:t>+void MOVE();</a:t>
             </a:r>
           </a:p>
           <a:p>
@@ -4152,69 +3882,17 @@
                 <a:latin typeface="Times New Roman" panose="02020603050405020304" pitchFamily="18" charset="0"/>
                 <a:cs typeface="Times New Roman" panose="02020603050405020304" pitchFamily="18" charset="0"/>
               </a:rPr>
-              <a:t>+void </a:t>
-            </a:r>
-            <a:r>
-              <a:rPr lang="en-US" sz="1200" dirty="0" err="1">
-                <a:latin typeface="Times New Roman" panose="02020603050405020304" pitchFamily="18" charset="0"/>
-                <a:cs typeface="Times New Roman" panose="02020603050405020304" pitchFamily="18" charset="0"/>
-              </a:rPr>
-              <a:t>drawBoard</a:t>
-            </a:r>
+              <a:t>+string GetUserInput(string _prompt);</a:t>
+            </a:r>
+          </a:p>
+          <a:p>
             <a:r>
               <a:rPr lang="en-US" sz="1200" dirty="0">
                 <a:latin typeface="Times New Roman" panose="02020603050405020304" pitchFamily="18" charset="0"/>
                 <a:cs typeface="Times New Roman" panose="02020603050405020304" pitchFamily="18" charset="0"/>
               </a:rPr>
-              <a:t>()</a:t>
-            </a:r>
-          </a:p>
-          <a:p>
-            <a:r>
-              <a:rPr lang="en-US" sz="1200" dirty="0">
-                <a:latin typeface="Times New Roman" panose="02020603050405020304" pitchFamily="18" charset="0"/>
-                <a:cs typeface="Times New Roman" panose="02020603050405020304" pitchFamily="18" charset="0"/>
-              </a:rPr>
-              <a:t>-void update()</a:t>
-            </a:r>
-          </a:p>
-          <a:p>
-            <a:r>
-              <a:rPr lang="en-US" sz="1200" dirty="0">
-                <a:latin typeface="Times New Roman" panose="02020603050405020304" pitchFamily="18" charset="0"/>
-                <a:cs typeface="Times New Roman" panose="02020603050405020304" pitchFamily="18" charset="0"/>
-              </a:rPr>
-              <a:t>+void prompt()</a:t>
-            </a:r>
-          </a:p>
-          <a:p>
-            <a:r>
-              <a:rPr lang="en-US" sz="1200" dirty="0">
-                <a:latin typeface="Times New Roman" panose="02020603050405020304" pitchFamily="18" charset="0"/>
-                <a:cs typeface="Times New Roman" panose="02020603050405020304" pitchFamily="18" charset="0"/>
-              </a:rPr>
-              <a:t>+</a:t>
-            </a:r>
-            <a:r>
-              <a:rPr lang="en-US" sz="1200">
-                <a:latin typeface="Times New Roman" panose="02020603050405020304" pitchFamily="18" charset="0"/>
-                <a:cs typeface="Times New Roman" panose="02020603050405020304" pitchFamily="18" charset="0"/>
-              </a:rPr>
-              <a:t>food</a:t>
-            </a:r>
-            <a:r>
-              <a:rPr lang="en-US" sz="1200" dirty="0">
-                <a:latin typeface="Times New Roman" panose="02020603050405020304" pitchFamily="18" charset="0"/>
-                <a:cs typeface="Times New Roman" panose="02020603050405020304" pitchFamily="18" charset="0"/>
-              </a:rPr>
-              <a:t>()</a:t>
-            </a:r>
-          </a:p>
-          <a:p>
-            <a:endParaRPr lang="en-US" sz="1200" dirty="0">
-              <a:latin typeface="Times New Roman" panose="02020603050405020304" pitchFamily="18" charset="0"/>
-              <a:cs typeface="Times New Roman" panose="02020603050405020304" pitchFamily="18" charset="0"/>
-            </a:endParaRPr>
+              <a:t>+~Input();</a:t>
+            </a:r>
           </a:p>
         </p:txBody>
       </p:sp>
@@ -4232,7 +3910,7 @@
         </p:nvSpPr>
         <p:spPr>
           <a:xfrm>
-            <a:off x="8367371" y="3599360"/>
+            <a:off x="7552013" y="3601782"/>
             <a:ext cx="2019869" cy="450855"/>
           </a:xfrm>
           <a:prstGeom prst="rect">
@@ -4266,7 +3944,7 @@
                 <a:latin typeface="Times New Roman" panose="02020603050405020304" pitchFamily="18" charset="0"/>
                 <a:cs typeface="Times New Roman" panose="02020603050405020304" pitchFamily="18" charset="0"/>
               </a:rPr>
-              <a:t>Movement</a:t>
+              <a:t>Direction</a:t>
             </a:r>
           </a:p>
         </p:txBody>
@@ -4285,8 +3963,8 @@
         </p:nvSpPr>
         <p:spPr>
           <a:xfrm>
-            <a:off x="8367371" y="4050215"/>
-            <a:ext cx="2019869" cy="1252179"/>
+            <a:off x="7552013" y="4052637"/>
+            <a:ext cx="2019869" cy="566147"/>
           </a:xfrm>
           <a:prstGeom prst="rect">
             <a:avLst/>
@@ -4325,53 +4003,17 @@
                 <a:latin typeface="Times New Roman" panose="02020603050405020304" pitchFamily="18" charset="0"/>
                 <a:cs typeface="Times New Roman" panose="02020603050405020304" pitchFamily="18" charset="0"/>
               </a:rPr>
-              <a:t>#define KEY_UP 72</a:t>
-            </a:r>
-          </a:p>
-          <a:p>
-            <a:r>
-              <a:rPr lang="en-US" sz="1200" dirty="0">
-                <a:latin typeface="Times New Roman" panose="02020603050405020304" pitchFamily="18" charset="0"/>
-                <a:cs typeface="Times New Roman" panose="02020603050405020304" pitchFamily="18" charset="0"/>
-              </a:rPr>
-              <a:t>#define KEY_DOWN 80</a:t>
-            </a:r>
-          </a:p>
-          <a:p>
-            <a:r>
-              <a:rPr lang="en-US" sz="1200" dirty="0">
-                <a:latin typeface="Times New Roman" panose="02020603050405020304" pitchFamily="18" charset="0"/>
-                <a:cs typeface="Times New Roman" panose="02020603050405020304" pitchFamily="18" charset="0"/>
-              </a:rPr>
-              <a:t>#define KEY_LEFT 75</a:t>
-            </a:r>
-          </a:p>
-          <a:p>
-            <a:r>
-              <a:rPr lang="en-US" sz="1200" dirty="0">
-                <a:latin typeface="Times New Roman" panose="02020603050405020304" pitchFamily="18" charset="0"/>
-                <a:cs typeface="Times New Roman" panose="02020603050405020304" pitchFamily="18" charset="0"/>
-              </a:rPr>
-              <a:t>#define KEY_RIGHT 77</a:t>
-            </a:r>
-          </a:p>
-          <a:p>
-            <a:r>
-              <a:rPr lang="en-US" sz="1200" dirty="0">
-                <a:latin typeface="Times New Roman" panose="02020603050405020304" pitchFamily="18" charset="0"/>
-                <a:cs typeface="Times New Roman" panose="02020603050405020304" pitchFamily="18" charset="0"/>
-              </a:rPr>
-              <a:t>-int key = 0</a:t>
-            </a:r>
-          </a:p>
-        </p:txBody>
-      </p:sp>
-      <p:sp>
-        <p:nvSpPr>
-          <p:cNvPr id="18" name="Rectangle 17">
-            <a:extLst>
-              <a:ext uri="{FF2B5EF4-FFF2-40B4-BE49-F238E27FC236}">
-                <a16:creationId xmlns:a16="http://schemas.microsoft.com/office/drawing/2014/main" id="{429D9D31-5A05-475A-A85E-CE0C1D23CE4C}"/>
+              <a:t>enum class Direction { STOP = 0, LEFT = 1, RIGHT = 2, UP = 3, DOWN = 4 };</a:t>
+            </a:r>
+          </a:p>
+        </p:txBody>
+      </p:sp>
+      <p:sp>
+        <p:nvSpPr>
+          <p:cNvPr id="21" name="Rectangle 20">
+            <a:extLst>
+              <a:ext uri="{FF2B5EF4-FFF2-40B4-BE49-F238E27FC236}">
+                <a16:creationId xmlns:a16="http://schemas.microsoft.com/office/drawing/2014/main" id="{DA421FB9-66D1-4048-9931-5A424BC5B7A6}"/>
               </a:ext>
             </a:extLst>
           </p:cNvPr>
@@ -4380,8 +4022,8 @@
         </p:nvSpPr>
         <p:spPr>
           <a:xfrm>
-            <a:off x="8367370" y="5302394"/>
-            <a:ext cx="2019869" cy="814975"/>
+            <a:off x="971098" y="901023"/>
+            <a:ext cx="2019869" cy="450855"/>
           </a:xfrm>
           <a:prstGeom prst="rect">
             <a:avLst/>
@@ -4405,43 +4047,458 @@
           <a:bodyPr rtlCol="0" anchor="ctr"/>
           <a:lstStyle/>
           <a:p>
+            <a:pPr algn="ctr"/>
+            <a:r>
+              <a:rPr lang="en-US" sz="1200" b="1" dirty="0">
+                <a:solidFill>
+                  <a:schemeClr val="tx1"/>
+                </a:solidFill>
+                <a:latin typeface="Times New Roman" panose="02020603050405020304" pitchFamily="18" charset="0"/>
+                <a:cs typeface="Times New Roman" panose="02020603050405020304" pitchFamily="18" charset="0"/>
+              </a:rPr>
+              <a:t>Gameloop</a:t>
+            </a:r>
+          </a:p>
+        </p:txBody>
+      </p:sp>
+      <p:sp>
+        <p:nvSpPr>
+          <p:cNvPr id="22" name="Rectangle 21">
+            <a:extLst>
+              <a:ext uri="{FF2B5EF4-FFF2-40B4-BE49-F238E27FC236}">
+                <a16:creationId xmlns:a16="http://schemas.microsoft.com/office/drawing/2014/main" id="{87B34508-C6CF-4A75-BE04-4A6FC3D83301}"/>
+              </a:ext>
+            </a:extLst>
+          </p:cNvPr>
+          <p:cNvSpPr/>
+          <p:nvPr/>
+        </p:nvSpPr>
+        <p:spPr>
+          <a:xfrm>
+            <a:off x="971098" y="1344739"/>
+            <a:ext cx="2019869" cy="1601067"/>
+          </a:xfrm>
+          <a:prstGeom prst="rect">
+            <a:avLst/>
+          </a:prstGeom>
+          <a:noFill/>
+          <a:ln w="12700" cap="flat" cmpd="sng" algn="ctr">
+            <a:solidFill>
+              <a:schemeClr val="dk1"/>
+            </a:solidFill>
+            <a:prstDash val="solid"/>
+            <a:round/>
+            <a:headEnd type="none" w="med" len="med"/>
+            <a:tailEnd type="none" w="med" len="med"/>
+          </a:ln>
+        </p:spPr>
+        <p:style>
+          <a:lnRef idx="0">
+            <a:scrgbClr r="0" g="0" b="0"/>
+          </a:lnRef>
+          <a:fillRef idx="0">
+            <a:scrgbClr r="0" g="0" b="0"/>
+          </a:fillRef>
+          <a:effectRef idx="0">
+            <a:scrgbClr r="0" g="0" b="0"/>
+          </a:effectRef>
+          <a:fontRef idx="minor">
+            <a:schemeClr val="dk1"/>
+          </a:fontRef>
+        </p:style>
+        <p:txBody>
+          <a:bodyPr rtlCol="0" anchor="ctr"/>
+          <a:lstStyle/>
+          <a:p>
             <a:r>
               <a:rPr lang="en-US" sz="1200" dirty="0">
                 <a:latin typeface="Times New Roman" panose="02020603050405020304" pitchFamily="18" charset="0"/>
                 <a:cs typeface="Times New Roman" panose="02020603050405020304" pitchFamily="18" charset="0"/>
               </a:rPr>
-              <a:t>#Move()</a:t>
+              <a:t>+const int WIDTH = 55;</a:t>
+            </a:r>
+          </a:p>
+          <a:p>
+            <a:r>
+              <a:rPr lang="en-US" sz="1200" dirty="0">
+                <a:latin typeface="Times New Roman" panose="02020603050405020304" pitchFamily="18" charset="0"/>
+                <a:cs typeface="Times New Roman" panose="02020603050405020304" pitchFamily="18" charset="0"/>
+              </a:rPr>
+              <a:t>+const int LENGTH = 25;</a:t>
+            </a:r>
+          </a:p>
+          <a:p>
+            <a:r>
+              <a:rPr lang="en-US" sz="1200" dirty="0">
+                <a:latin typeface="Times New Roman" panose="02020603050405020304" pitchFamily="18" charset="0"/>
+                <a:cs typeface="Times New Roman" panose="02020603050405020304" pitchFamily="18" charset="0"/>
+              </a:rPr>
+              <a:t>+int x = 0;</a:t>
+            </a:r>
+          </a:p>
+          <a:p>
+            <a:r>
+              <a:rPr lang="en-US" sz="1200" dirty="0">
+                <a:latin typeface="Times New Roman" panose="02020603050405020304" pitchFamily="18" charset="0"/>
+                <a:cs typeface="Times New Roman" panose="02020603050405020304" pitchFamily="18" charset="0"/>
+              </a:rPr>
+              <a:t>+int y = 0;</a:t>
+            </a:r>
+          </a:p>
+          <a:p>
+            <a:r>
+              <a:rPr lang="en-US" sz="1200" dirty="0">
+                <a:latin typeface="Times New Roman" panose="02020603050405020304" pitchFamily="18" charset="0"/>
+                <a:cs typeface="Times New Roman" panose="02020603050405020304" pitchFamily="18" charset="0"/>
+              </a:rPr>
+              <a:t>+int fruitX = 0;</a:t>
+            </a:r>
+          </a:p>
+          <a:p>
+            <a:r>
+              <a:rPr lang="en-US" sz="1200" dirty="0">
+                <a:latin typeface="Times New Roman" panose="02020603050405020304" pitchFamily="18" charset="0"/>
+                <a:cs typeface="Times New Roman" panose="02020603050405020304" pitchFamily="18" charset="0"/>
+              </a:rPr>
+              <a:t>+int fruitY = 0;</a:t>
+            </a:r>
+          </a:p>
+          <a:p>
+            <a:r>
+              <a:rPr lang="en-US" sz="1200" dirty="0">
+                <a:latin typeface="Times New Roman" panose="02020603050405020304" pitchFamily="18" charset="0"/>
+                <a:cs typeface="Times New Roman" panose="02020603050405020304" pitchFamily="18" charset="0"/>
+              </a:rPr>
+              <a:t>+int score = 0;</a:t>
+            </a:r>
+          </a:p>
+          <a:p>
+            <a:r>
+              <a:rPr lang="en-US" sz="1200" dirty="0">
+                <a:latin typeface="Times New Roman" panose="02020603050405020304" pitchFamily="18" charset="0"/>
+                <a:cs typeface="Times New Roman" panose="02020603050405020304" pitchFamily="18" charset="0"/>
+              </a:rPr>
+              <a:t>+bool gameOver;</a:t>
+            </a:r>
+          </a:p>
+          <a:p>
+            <a:endParaRPr lang="en-US" sz="1200" dirty="0">
+              <a:latin typeface="Times New Roman" panose="02020603050405020304" pitchFamily="18" charset="0"/>
+              <a:cs typeface="Times New Roman" panose="02020603050405020304" pitchFamily="18" charset="0"/>
+            </a:endParaRPr>
+          </a:p>
+        </p:txBody>
+      </p:sp>
+      <p:sp>
+        <p:nvSpPr>
+          <p:cNvPr id="24" name="Rectangle 23">
+            <a:extLst>
+              <a:ext uri="{FF2B5EF4-FFF2-40B4-BE49-F238E27FC236}">
+                <a16:creationId xmlns:a16="http://schemas.microsoft.com/office/drawing/2014/main" id="{0FE81831-443F-4D57-9BC4-74688AC04429}"/>
+              </a:ext>
+            </a:extLst>
+          </p:cNvPr>
+          <p:cNvSpPr/>
+          <p:nvPr/>
+        </p:nvSpPr>
+        <p:spPr>
+          <a:xfrm>
+            <a:off x="971097" y="2853095"/>
+            <a:ext cx="2019869" cy="1668571"/>
+          </a:xfrm>
+          <a:prstGeom prst="rect">
+            <a:avLst/>
+          </a:prstGeom>
+        </p:spPr>
+        <p:style>
+          <a:lnRef idx="2">
+            <a:schemeClr val="dk1"/>
+          </a:lnRef>
+          <a:fillRef idx="1">
+            <a:schemeClr val="lt1"/>
+          </a:fillRef>
+          <a:effectRef idx="0">
+            <a:schemeClr val="dk1"/>
+          </a:effectRef>
+          <a:fontRef idx="minor">
+            <a:schemeClr val="dk1"/>
+          </a:fontRef>
+        </p:style>
+        <p:txBody>
+          <a:bodyPr rtlCol="0" anchor="ctr"/>
+          <a:lstStyle/>
+          <a:p>
+            <a:r>
+              <a:rPr lang="en-US" sz="1200" dirty="0">
+                <a:latin typeface="Times New Roman" panose="02020603050405020304" pitchFamily="18" charset="0"/>
+                <a:cs typeface="Times New Roman" panose="02020603050405020304" pitchFamily="18" charset="0"/>
+              </a:rPr>
+              <a:t>+GameLoop();</a:t>
+            </a:r>
+          </a:p>
+          <a:p>
+            <a:r>
+              <a:rPr lang="en-US" sz="1200" dirty="0">
+                <a:latin typeface="Times New Roman" panose="02020603050405020304" pitchFamily="18" charset="0"/>
+                <a:cs typeface="Times New Roman" panose="02020603050405020304" pitchFamily="18" charset="0"/>
+              </a:rPr>
+              <a:t>+void Run();</a:t>
+            </a:r>
+          </a:p>
+          <a:p>
+            <a:r>
+              <a:rPr lang="en-US" sz="1200" dirty="0">
+                <a:latin typeface="Times New Roman" panose="02020603050405020304" pitchFamily="18" charset="0"/>
+                <a:cs typeface="Times New Roman" panose="02020603050405020304" pitchFamily="18" charset="0"/>
+              </a:rPr>
+              <a:t>+void Update();</a:t>
+            </a:r>
+          </a:p>
+          <a:p>
+            <a:r>
+              <a:rPr lang="en-US" sz="1200" dirty="0">
+                <a:latin typeface="Times New Roman" panose="02020603050405020304" pitchFamily="18" charset="0"/>
+                <a:cs typeface="Times New Roman" panose="02020603050405020304" pitchFamily="18" charset="0"/>
+              </a:rPr>
+              <a:t>+void Draw();</a:t>
+            </a:r>
+          </a:p>
+          <a:p>
+            <a:r>
+              <a:rPr lang="en-US" sz="1200" dirty="0">
+                <a:latin typeface="Times New Roman" panose="02020603050405020304" pitchFamily="18" charset="0"/>
+                <a:cs typeface="Times New Roman" panose="02020603050405020304" pitchFamily="18" charset="0"/>
+              </a:rPr>
+              <a:t>+void Logic(Direction dir);</a:t>
+            </a:r>
+          </a:p>
+          <a:p>
+            <a:r>
+              <a:rPr lang="en-US" sz="1200" dirty="0">
+                <a:latin typeface="Times New Roman" panose="02020603050405020304" pitchFamily="18" charset="0"/>
+                <a:cs typeface="Times New Roman" panose="02020603050405020304" pitchFamily="18" charset="0"/>
+              </a:rPr>
+              <a:t>+void SpawnNewFruit();</a:t>
+            </a:r>
+          </a:p>
+          <a:p>
+            <a:r>
+              <a:rPr lang="en-US" sz="1200" dirty="0">
+                <a:latin typeface="Times New Roman" panose="02020603050405020304" pitchFamily="18" charset="0"/>
+                <a:cs typeface="Times New Roman" panose="02020603050405020304" pitchFamily="18" charset="0"/>
+              </a:rPr>
+              <a:t>+void DeleteLastSnakeSegment();</a:t>
+            </a:r>
+          </a:p>
+          <a:p>
+            <a:r>
+              <a:rPr lang="en-US" sz="1200" dirty="0">
+                <a:latin typeface="Times New Roman" panose="02020603050405020304" pitchFamily="18" charset="0"/>
+                <a:cs typeface="Times New Roman" panose="02020603050405020304" pitchFamily="18" charset="0"/>
+              </a:rPr>
+              <a:t>+void CLS();</a:t>
+            </a:r>
+          </a:p>
+        </p:txBody>
+      </p:sp>
+      <p:sp>
+        <p:nvSpPr>
+          <p:cNvPr id="25" name="Rectangle 24">
+            <a:extLst>
+              <a:ext uri="{FF2B5EF4-FFF2-40B4-BE49-F238E27FC236}">
+                <a16:creationId xmlns:a16="http://schemas.microsoft.com/office/drawing/2014/main" id="{298F9A49-1786-4586-843A-20471314F57E}"/>
+              </a:ext>
+            </a:extLst>
+          </p:cNvPr>
+          <p:cNvSpPr/>
+          <p:nvPr/>
+        </p:nvSpPr>
+        <p:spPr>
+          <a:xfrm>
+            <a:off x="971097" y="4521666"/>
+            <a:ext cx="2019869" cy="1124125"/>
+          </a:xfrm>
+          <a:prstGeom prst="rect">
+            <a:avLst/>
+          </a:prstGeom>
+        </p:spPr>
+        <p:style>
+          <a:lnRef idx="2">
+            <a:schemeClr val="dk1"/>
+          </a:lnRef>
+          <a:fillRef idx="1">
+            <a:schemeClr val="lt1"/>
+          </a:fillRef>
+          <a:effectRef idx="0">
+            <a:schemeClr val="dk1"/>
+          </a:effectRef>
+          <a:fontRef idx="minor">
+            <a:schemeClr val="dk1"/>
+          </a:fontRef>
+        </p:style>
+        <p:txBody>
+          <a:bodyPr rtlCol="0" anchor="ctr"/>
+          <a:lstStyle/>
+          <a:p>
+            <a:r>
+              <a:rPr lang="en-US" sz="1200" dirty="0">
+                <a:latin typeface="Times New Roman" panose="02020603050405020304" pitchFamily="18" charset="0"/>
+                <a:cs typeface="Times New Roman" panose="02020603050405020304" pitchFamily="18" charset="0"/>
+              </a:rPr>
+              <a:t>+Direction direction = Direction::RIGHT;</a:t>
+            </a:r>
+          </a:p>
+          <a:p>
+            <a:r>
+              <a:rPr lang="en-US" sz="1200" dirty="0">
+                <a:latin typeface="Times New Roman" panose="02020603050405020304" pitchFamily="18" charset="0"/>
+                <a:cs typeface="Times New Roman" panose="02020603050405020304" pitchFamily="18" charset="0"/>
+              </a:rPr>
+              <a:t>-class Input* inputHandler = nullptr;</a:t>
+            </a:r>
+          </a:p>
+          <a:p>
+            <a:r>
+              <a:rPr lang="en-US" sz="1200" dirty="0">
+                <a:latin typeface="Times New Roman" panose="02020603050405020304" pitchFamily="18" charset="0"/>
+                <a:cs typeface="Times New Roman" panose="02020603050405020304" pitchFamily="18" charset="0"/>
+              </a:rPr>
+              <a:t>-class Snake* snake = nullptr;</a:t>
+            </a:r>
+          </a:p>
+          <a:p>
+            <a:r>
+              <a:rPr lang="en-US" sz="1200" dirty="0">
+                <a:latin typeface="Times New Roman" panose="02020603050405020304" pitchFamily="18" charset="0"/>
+                <a:cs typeface="Times New Roman" panose="02020603050405020304" pitchFamily="18" charset="0"/>
+              </a:rPr>
+              <a:t>-class Menu* menu = nullptr;</a:t>
+            </a:r>
+          </a:p>
+        </p:txBody>
+      </p:sp>
+      <p:sp>
+        <p:nvSpPr>
+          <p:cNvPr id="26" name="Rectangle 25">
+            <a:extLst>
+              <a:ext uri="{FF2B5EF4-FFF2-40B4-BE49-F238E27FC236}">
+                <a16:creationId xmlns:a16="http://schemas.microsoft.com/office/drawing/2014/main" id="{C733AB68-1310-4D0F-BE09-83092832AF65}"/>
+              </a:ext>
+            </a:extLst>
+          </p:cNvPr>
+          <p:cNvSpPr/>
+          <p:nvPr/>
+        </p:nvSpPr>
+        <p:spPr>
+          <a:xfrm>
+            <a:off x="4076130" y="2354509"/>
+            <a:ext cx="2019869" cy="450855"/>
+          </a:xfrm>
+          <a:prstGeom prst="rect">
+            <a:avLst/>
+          </a:prstGeom>
+        </p:spPr>
+        <p:style>
+          <a:lnRef idx="2">
+            <a:schemeClr val="dk1"/>
+          </a:lnRef>
+          <a:fillRef idx="1">
+            <a:schemeClr val="lt1"/>
+          </a:fillRef>
+          <a:effectRef idx="0">
+            <a:schemeClr val="dk1"/>
+          </a:effectRef>
+          <a:fontRef idx="minor">
+            <a:schemeClr val="dk1"/>
+          </a:fontRef>
+        </p:style>
+        <p:txBody>
+          <a:bodyPr rtlCol="0" anchor="ctr"/>
+          <a:lstStyle/>
+          <a:p>
+            <a:r>
+              <a:rPr lang="en-US" sz="1200" dirty="0">
+                <a:latin typeface="Times New Roman" panose="02020603050405020304" pitchFamily="18" charset="0"/>
+                <a:cs typeface="Times New Roman" panose="02020603050405020304" pitchFamily="18" charset="0"/>
+              </a:rPr>
+              <a:t>-class Input* inputHandler = nullptr;</a:t>
+            </a:r>
+          </a:p>
+        </p:txBody>
+      </p:sp>
+      <p:sp>
+        <p:nvSpPr>
+          <p:cNvPr id="27" name="Rectangle 26">
+            <a:extLst>
+              <a:ext uri="{FF2B5EF4-FFF2-40B4-BE49-F238E27FC236}">
+                <a16:creationId xmlns:a16="http://schemas.microsoft.com/office/drawing/2014/main" id="{268493C4-100C-48CF-BE50-29A5C6BB7FAD}"/>
+              </a:ext>
+            </a:extLst>
+          </p:cNvPr>
+          <p:cNvSpPr/>
+          <p:nvPr/>
+        </p:nvSpPr>
+        <p:spPr>
+          <a:xfrm>
+            <a:off x="4076130" y="5261217"/>
+            <a:ext cx="2019869" cy="384574"/>
+          </a:xfrm>
+          <a:prstGeom prst="rect">
+            <a:avLst/>
+          </a:prstGeom>
+        </p:spPr>
+        <p:style>
+          <a:lnRef idx="2">
+            <a:schemeClr val="dk1"/>
+          </a:lnRef>
+          <a:fillRef idx="1">
+            <a:schemeClr val="lt1"/>
+          </a:fillRef>
+          <a:effectRef idx="0">
+            <a:schemeClr val="dk1"/>
+          </a:effectRef>
+          <a:fontRef idx="minor">
+            <a:schemeClr val="dk1"/>
+          </a:fontRef>
+        </p:style>
+        <p:txBody>
+          <a:bodyPr rtlCol="0" anchor="ctr"/>
+          <a:lstStyle/>
+          <a:p>
+            <a:r>
+              <a:rPr lang="en-US" sz="1200" dirty="0">
+                <a:latin typeface="Times New Roman" panose="02020603050405020304" pitchFamily="18" charset="0"/>
+                <a:cs typeface="Times New Roman" panose="02020603050405020304" pitchFamily="18" charset="0"/>
+              </a:rPr>
+              <a:t>+class GameLoop * mainGame = nullptr;</a:t>
             </a:r>
           </a:p>
         </p:txBody>
       </p:sp>
       <p:cxnSp>
         <p:nvCxnSpPr>
-          <p:cNvPr id="20" name="Straight Connector 19">
-            <a:extLst>
-              <a:ext uri="{FF2B5EF4-FFF2-40B4-BE49-F238E27FC236}">
-                <a16:creationId xmlns:a16="http://schemas.microsoft.com/office/drawing/2014/main" id="{871C4471-214A-4733-8170-D8F51EA9D41A}"/>
+          <p:cNvPr id="5" name="Straight Connector 4">
+            <a:extLst>
+              <a:ext uri="{FF2B5EF4-FFF2-40B4-BE49-F238E27FC236}">
+                <a16:creationId xmlns:a16="http://schemas.microsoft.com/office/drawing/2014/main" id="{150C8AB5-3EE9-4B69-9594-9EDE67B0B910}"/>
               </a:ext>
             </a:extLst>
           </p:cNvPr>
           <p:cNvCxnSpPr>
             <a:cxnSpLocks/>
+            <a:stCxn id="22" idx="3"/>
+            <a:endCxn id="9" idx="1"/>
           </p:cNvCxnSpPr>
           <p:nvPr/>
         </p:nvCxnSpPr>
         <p:spPr>
-          <a:xfrm>
-            <a:off x="4299586" y="2866029"/>
-            <a:ext cx="0" cy="450856"/>
+          <a:xfrm flipV="1">
+            <a:off x="2990967" y="1965430"/>
+            <a:ext cx="1085164" cy="179843"/>
           </a:xfrm>
           <a:prstGeom prst="line">
             <a:avLst/>
           </a:prstGeom>
-          <a:ln w="28575">
-            <a:solidFill>
-              <a:schemeClr val="tx1"/>
-            </a:solidFill>
-          </a:ln>
         </p:spPr>
         <p:style>
           <a:lnRef idx="1">
@@ -4460,32 +4517,113 @@
       </p:cxnSp>
       <p:cxnSp>
         <p:nvCxnSpPr>
-          <p:cNvPr id="23" name="Straight Connector 22">
-            <a:extLst>
-              <a:ext uri="{FF2B5EF4-FFF2-40B4-BE49-F238E27FC236}">
-                <a16:creationId xmlns:a16="http://schemas.microsoft.com/office/drawing/2014/main" id="{7C903B7A-DA09-4F7B-90FF-D288D2750604}"/>
+          <p:cNvPr id="29" name="Straight Connector 28">
+            <a:extLst>
+              <a:ext uri="{FF2B5EF4-FFF2-40B4-BE49-F238E27FC236}">
+                <a16:creationId xmlns:a16="http://schemas.microsoft.com/office/drawing/2014/main" id="{A7BBFF81-40CE-45D3-8072-B31DAB72A95E}"/>
               </a:ext>
             </a:extLst>
           </p:cNvPr>
           <p:cNvCxnSpPr>
             <a:cxnSpLocks/>
-            <a:stCxn id="8" idx="3"/>
+            <a:stCxn id="26" idx="2"/>
+            <a:endCxn id="13" idx="0"/>
           </p:cNvCxnSpPr>
           <p:nvPr/>
         </p:nvCxnSpPr>
         <p:spPr>
           <a:xfrm>
-            <a:off x="5336275" y="1590204"/>
-            <a:ext cx="1519452" cy="0"/>
+            <a:off x="5086065" y="2805364"/>
+            <a:ext cx="2" cy="247000"/>
           </a:xfrm>
           <a:prstGeom prst="line">
             <a:avLst/>
           </a:prstGeom>
-          <a:ln w="12700">
-            <a:solidFill>
-              <a:schemeClr val="tx1"/>
-            </a:solidFill>
-          </a:ln>
+        </p:spPr>
+        <p:style>
+          <a:lnRef idx="1">
+            <a:schemeClr val="accent1"/>
+          </a:lnRef>
+          <a:fillRef idx="0">
+            <a:schemeClr val="accent1"/>
+          </a:fillRef>
+          <a:effectRef idx="0">
+            <a:schemeClr val="accent1"/>
+          </a:effectRef>
+          <a:fontRef idx="minor">
+            <a:schemeClr val="tx1"/>
+          </a:fontRef>
+        </p:style>
+      </p:cxnSp>
+      <p:sp>
+        <p:nvSpPr>
+          <p:cNvPr id="31" name="Arrow: Right 30">
+            <a:extLst>
+              <a:ext uri="{FF2B5EF4-FFF2-40B4-BE49-F238E27FC236}">
+                <a16:creationId xmlns:a16="http://schemas.microsoft.com/office/drawing/2014/main" id="{0C9B518B-CC26-417B-81CC-CDAFA5C7A2F9}"/>
+              </a:ext>
+            </a:extLst>
+          </p:cNvPr>
+          <p:cNvSpPr/>
+          <p:nvPr/>
+        </p:nvSpPr>
+        <p:spPr>
+          <a:xfrm rot="5400000">
+            <a:off x="5026180" y="2935113"/>
+            <a:ext cx="119768" cy="106558"/>
+          </a:xfrm>
+          <a:prstGeom prst="rightArrow">
+            <a:avLst/>
+          </a:prstGeom>
+        </p:spPr>
+        <p:style>
+          <a:lnRef idx="2">
+            <a:schemeClr val="accent1">
+              <a:shade val="50000"/>
+            </a:schemeClr>
+          </a:lnRef>
+          <a:fillRef idx="1">
+            <a:schemeClr val="accent1"/>
+          </a:fillRef>
+          <a:effectRef idx="0">
+            <a:schemeClr val="accent1"/>
+          </a:effectRef>
+          <a:fontRef idx="minor">
+            <a:schemeClr val="lt1"/>
+          </a:fontRef>
+        </p:style>
+        <p:txBody>
+          <a:bodyPr rtlCol="0" anchor="ctr"/>
+          <a:lstStyle/>
+          <a:p>
+            <a:pPr algn="ctr"/>
+            <a:endParaRPr lang="en-US"/>
+          </a:p>
+        </p:txBody>
+      </p:sp>
+      <p:cxnSp>
+        <p:nvCxnSpPr>
+          <p:cNvPr id="34" name="Straight Connector 33">
+            <a:extLst>
+              <a:ext uri="{FF2B5EF4-FFF2-40B4-BE49-F238E27FC236}">
+                <a16:creationId xmlns:a16="http://schemas.microsoft.com/office/drawing/2014/main" id="{6C8781DA-5ABD-4DAA-A329-99ECF2095786}"/>
+              </a:ext>
+            </a:extLst>
+          </p:cNvPr>
+          <p:cNvCxnSpPr>
+            <a:cxnSpLocks/>
+            <a:stCxn id="14" idx="3"/>
+          </p:cNvCxnSpPr>
+          <p:nvPr/>
+        </p:nvCxnSpPr>
+        <p:spPr>
+          <a:xfrm flipV="1">
+            <a:off x="6096001" y="2301155"/>
+            <a:ext cx="1456010" cy="1606425"/>
+          </a:xfrm>
+          <a:prstGeom prst="line">
+            <a:avLst/>
+          </a:prstGeom>
         </p:spPr>
         <p:style>
           <a:lnRef idx="1">
@@ -4504,10 +4642,10 @@
       </p:cxnSp>
       <p:cxnSp>
         <p:nvCxnSpPr>
-          <p:cNvPr id="33" name="Connector: Elbow 32">
-            <a:extLst>
-              <a:ext uri="{FF2B5EF4-FFF2-40B4-BE49-F238E27FC236}">
-                <a16:creationId xmlns:a16="http://schemas.microsoft.com/office/drawing/2014/main" id="{E9BFDA2D-A769-43D0-A0D8-E03D8435DC1A}"/>
+          <p:cNvPr id="38" name="Straight Connector 37">
+            <a:extLst>
+              <a:ext uri="{FF2B5EF4-FFF2-40B4-BE49-F238E27FC236}">
+                <a16:creationId xmlns:a16="http://schemas.microsoft.com/office/drawing/2014/main" id="{7C5DCE19-770A-4BCD-B322-37039DEADA56}"/>
               </a:ext>
             </a:extLst>
           </p:cNvPr>
@@ -4517,20 +4655,13 @@
           <p:nvPr/>
         </p:nvCxnSpPr>
         <p:spPr>
-          <a:xfrm rot="16200000" flipV="1">
-            <a:off x="8385915" y="2334736"/>
-            <a:ext cx="1887848" cy="679271"/>
+          <a:xfrm flipV="1">
+            <a:off x="6095999" y="4127198"/>
+            <a:ext cx="1456012" cy="491586"/>
           </a:xfrm>
-          <a:prstGeom prst="bentConnector2">
+          <a:prstGeom prst="line">
             <a:avLst/>
           </a:prstGeom>
-          <a:ln w="15875" cap="flat" cmpd="thinThick">
-            <a:solidFill>
-              <a:schemeClr val="tx1"/>
-            </a:solidFill>
-            <a:round/>
-            <a:tailEnd type="triangle"/>
-          </a:ln>
         </p:spPr>
         <p:style>
           <a:lnRef idx="1">
@@ -4547,60 +4678,46 @@
           </a:fontRef>
         </p:style>
       </p:cxnSp>
-      <p:sp>
-        <p:nvSpPr>
-          <p:cNvPr id="35" name="Isosceles Triangle 34">
-            <a:extLst>
-              <a:ext uri="{FF2B5EF4-FFF2-40B4-BE49-F238E27FC236}">
-                <a16:creationId xmlns:a16="http://schemas.microsoft.com/office/drawing/2014/main" id="{7A63274D-9BA6-4BA1-A01D-1300D7FA6B22}"/>
-              </a:ext>
-            </a:extLst>
-          </p:cNvPr>
-          <p:cNvSpPr/>
+      <p:cxnSp>
+        <p:nvCxnSpPr>
+          <p:cNvPr id="41" name="Straight Connector 40">
+            <a:extLst>
+              <a:ext uri="{FF2B5EF4-FFF2-40B4-BE49-F238E27FC236}">
+                <a16:creationId xmlns:a16="http://schemas.microsoft.com/office/drawing/2014/main" id="{0A8EE41F-3FCC-4427-8401-B52767E1F6E3}"/>
+              </a:ext>
+            </a:extLst>
+          </p:cNvPr>
+          <p:cNvCxnSpPr>
+            <a:cxnSpLocks/>
+            <a:stCxn id="16" idx="0"/>
+            <a:endCxn id="12" idx="2"/>
+          </p:cNvCxnSpPr>
           <p:nvPr/>
-        </p:nvSpPr>
+        </p:nvCxnSpPr>
         <p:spPr>
-          <a:xfrm rot="16200000">
-            <a:off x="8849959" y="1636196"/>
-            <a:ext cx="280490" cy="229215"/>
+          <a:xfrm flipV="1">
+            <a:off x="8561948" y="2805364"/>
+            <a:ext cx="0" cy="796418"/>
           </a:xfrm>
-          <a:prstGeom prst="triangle">
+          <a:prstGeom prst="line">
             <a:avLst/>
           </a:prstGeom>
-          <a:solidFill>
-            <a:schemeClr val="bg1"/>
-          </a:solidFill>
-          <a:ln>
-            <a:solidFill>
-              <a:schemeClr val="tx1"/>
-            </a:solidFill>
-          </a:ln>
         </p:spPr>
         <p:style>
-          <a:lnRef idx="2">
-            <a:schemeClr val="accent1">
-              <a:shade val="50000"/>
-            </a:schemeClr>
+          <a:lnRef idx="1">
+            <a:schemeClr val="accent1"/>
           </a:lnRef>
-          <a:fillRef idx="1">
+          <a:fillRef idx="0">
             <a:schemeClr val="accent1"/>
           </a:fillRef>
           <a:effectRef idx="0">
             <a:schemeClr val="accent1"/>
           </a:effectRef>
           <a:fontRef idx="minor">
-            <a:schemeClr val="lt1"/>
+            <a:schemeClr val="tx1"/>
           </a:fontRef>
         </p:style>
-        <p:txBody>
-          <a:bodyPr rtlCol="0" anchor="ctr"/>
-          <a:lstStyle/>
-          <a:p>
-            <a:pPr algn="ctr"/>
-            <a:endParaRPr lang="en-US"/>
-          </a:p>
-        </p:txBody>
-      </p:sp>
+      </p:cxnSp>
     </p:spTree>
     <p:extLst>
       <p:ext uri="{BB962C8B-B14F-4D97-AF65-F5344CB8AC3E}">

</xml_diff>